<commit_message>
changed class diagram in slide
</commit_message>
<xml_diff>
--- a/doc/apcl_presentation.pptx
+++ b/doc/apcl_presentation.pptx
@@ -112,6 +112,22 @@
       </a:defRPr>
     </a:lvl9pPr>
   </p:defaultTextStyle>
+  <p:extLst>
+    <p:ext uri="{EFAFB233-063F-42B5-8137-9DF3F51BA10A}">
+      <p15:sldGuideLst xmlns:p15="http://schemas.microsoft.com/office/powerpoint/2012/main">
+        <p15:guide id="1" orient="horz" pos="2160">
+          <p15:clr>
+            <a:srgbClr val="A4A3A4"/>
+          </p15:clr>
+        </p15:guide>
+        <p15:guide id="2" pos="2880">
+          <p15:clr>
+            <a:srgbClr val="A4A3A4"/>
+          </p15:clr>
+        </p15:guide>
+      </p15:sldGuideLst>
+    </p:ext>
+  </p:extLst>
 </p:presentation>
 </file>
 
@@ -252,7 +268,7 @@
           <a:p>
             <a:fld id="{1149BB35-C4B1-4624-8F8C-F6F9A7C4A52E}" type="datetimeFigureOut">
               <a:rPr lang="en-US" smtClean="0"/>
-              <a:t>11/22/2013</a:t>
+              <a:t>11/25/2013</a:t>
             </a:fld>
             <a:endParaRPr lang="en-US"/>
           </a:p>
@@ -1121,7 +1137,7 @@
           <a:p>
             <a:fld id="{1149BB35-C4B1-4624-8F8C-F6F9A7C4A52E}" type="datetimeFigureOut">
               <a:rPr lang="en-US" smtClean="0"/>
-              <a:t>11/22/2013</a:t>
+              <a:t>11/25/2013</a:t>
             </a:fld>
             <a:endParaRPr lang="en-US"/>
           </a:p>
@@ -1296,7 +1312,7 @@
           <a:p>
             <a:fld id="{1149BB35-C4B1-4624-8F8C-F6F9A7C4A52E}" type="datetimeFigureOut">
               <a:rPr lang="en-US" smtClean="0"/>
-              <a:t>11/22/2013</a:t>
+              <a:t>11/25/2013</a:t>
             </a:fld>
             <a:endParaRPr lang="en-US"/>
           </a:p>
@@ -1466,7 +1482,7 @@
           <a:p>
             <a:fld id="{1149BB35-C4B1-4624-8F8C-F6F9A7C4A52E}" type="datetimeFigureOut">
               <a:rPr lang="en-US" smtClean="0"/>
-              <a:t>11/22/2013</a:t>
+              <a:t>11/25/2013</a:t>
             </a:fld>
             <a:endParaRPr lang="en-US"/>
           </a:p>
@@ -1676,7 +1692,7 @@
           <a:p>
             <a:fld id="{1149BB35-C4B1-4624-8F8C-F6F9A7C4A52E}" type="datetimeFigureOut">
               <a:rPr lang="en-US" smtClean="0"/>
-              <a:t>11/22/2013</a:t>
+              <a:t>11/25/2013</a:t>
             </a:fld>
             <a:endParaRPr lang="en-US"/>
           </a:p>
@@ -2490,7 +2506,7 @@
           <a:p>
             <a:fld id="{1149BB35-C4B1-4624-8F8C-F6F9A7C4A52E}" type="datetimeFigureOut">
               <a:rPr lang="en-US" smtClean="0"/>
-              <a:t>11/22/2013</a:t>
+              <a:t>11/25/2013</a:t>
             </a:fld>
             <a:endParaRPr lang="en-US"/>
           </a:p>
@@ -2726,7 +2742,7 @@
           <a:p>
             <a:fld id="{1149BB35-C4B1-4624-8F8C-F6F9A7C4A52E}" type="datetimeFigureOut">
               <a:rPr lang="en-US" smtClean="0"/>
-              <a:t>11/22/2013</a:t>
+              <a:t>11/25/2013</a:t>
             </a:fld>
             <a:endParaRPr lang="en-US"/>
           </a:p>
@@ -3049,7 +3065,7 @@
           <a:p>
             <a:fld id="{1149BB35-C4B1-4624-8F8C-F6F9A7C4A52E}" type="datetimeFigureOut">
               <a:rPr lang="en-US" smtClean="0"/>
-              <a:t>11/22/2013</a:t>
+              <a:t>11/25/2013</a:t>
             </a:fld>
             <a:endParaRPr lang="en-US"/>
           </a:p>
@@ -3139,7 +3155,7 @@
           <a:p>
             <a:fld id="{1149BB35-C4B1-4624-8F8C-F6F9A7C4A52E}" type="datetimeFigureOut">
               <a:rPr lang="en-US" smtClean="0"/>
-              <a:t>11/22/2013</a:t>
+              <a:t>11/25/2013</a:t>
             </a:fld>
             <a:endParaRPr lang="en-US"/>
           </a:p>
@@ -3656,7 +3672,7 @@
           <a:p>
             <a:fld id="{1149BB35-C4B1-4624-8F8C-F6F9A7C4A52E}" type="datetimeFigureOut">
               <a:rPr lang="en-US" smtClean="0"/>
-              <a:t>11/22/2013</a:t>
+              <a:t>11/25/2013</a:t>
             </a:fld>
             <a:endParaRPr lang="en-US"/>
           </a:p>
@@ -4167,7 +4183,7 @@
           <a:p>
             <a:fld id="{1149BB35-C4B1-4624-8F8C-F6F9A7C4A52E}" type="datetimeFigureOut">
               <a:rPr lang="en-US" smtClean="0"/>
-              <a:t>11/22/2013</a:t>
+              <a:t>11/25/2013</a:t>
             </a:fld>
             <a:endParaRPr lang="en-US"/>
           </a:p>
@@ -4412,7 +4428,7 @@
           <a:p>
             <a:fld id="{1149BB35-C4B1-4624-8F8C-F6F9A7C4A52E}" type="datetimeFigureOut">
               <a:rPr lang="en-US" smtClean="0"/>
-              <a:t>11/22/2013</a:t>
+              <a:t>11/25/2013</a:t>
             </a:fld>
             <a:endParaRPr lang="en-US"/>
           </a:p>
@@ -5289,7 +5305,6 @@
               <a:rPr lang="en-US" dirty="0" smtClean="0"/>
               <a:t>Kinect Camera </a:t>
             </a:r>
-            <a:endParaRPr lang="en-US" dirty="0" smtClean="0"/>
           </a:p>
           <a:p>
             <a:pPr lvl="1"/>
@@ -5349,11 +5364,7 @@
             </a:r>
             <a:r>
               <a:rPr lang="en-US" dirty="0" err="1" smtClean="0"/>
-              <a:t>o</a:t>
-            </a:r>
-            <a:r>
-              <a:rPr lang="en-US" dirty="0" err="1" smtClean="0"/>
-              <a:t>utliar</a:t>
+              <a:t>outliar</a:t>
             </a:r>
             <a:r>
               <a:rPr lang="en-US" dirty="0" smtClean="0"/>
@@ -5368,11 +5379,7 @@
             </a:r>
             <a:r>
               <a:rPr lang="en-US" dirty="0" err="1" smtClean="0"/>
-              <a:t>o</a:t>
-            </a:r>
-            <a:r>
-              <a:rPr lang="en-US" dirty="0" err="1" smtClean="0"/>
-              <a:t>utliar</a:t>
+              <a:t>outliar</a:t>
             </a:r>
             <a:r>
               <a:rPr lang="en-US" dirty="0" smtClean="0"/>
@@ -5455,12 +5462,6 @@
           <a:bodyPr/>
           <a:lstStyle/>
           <a:p>
-            <a:r>
-              <a:rPr lang="en-US" dirty="0" smtClean="0"/>
-              <a:t>Class Diagram</a:t>
-            </a:r>
-          </a:p>
-          <a:p>
             <a:pPr>
               <a:buNone/>
             </a:pPr>
@@ -5470,22 +5471,28 @@
       </p:sp>
       <p:pic>
         <p:nvPicPr>
-          <p:cNvPr id="4" name="Picture 3" descr="class_diagram.jpg"/>
+          <p:cNvPr id="4" name="Picture 3"/>
           <p:cNvPicPr>
             <a:picLocks noChangeAspect="1"/>
           </p:cNvPicPr>
           <p:nvPr/>
         </p:nvPicPr>
         <p:blipFill>
-          <a:blip r:embed="rId2"/>
+          <a:blip r:embed="rId2">
+            <a:extLst>
+              <a:ext uri="{28A0092B-C50C-407E-A947-70E740481C1C}">
+                <a14:useLocalDpi xmlns:a14="http://schemas.microsoft.com/office/drawing/2010/main" val="0"/>
+              </a:ext>
+            </a:extLst>
+          </a:blip>
           <a:stretch>
             <a:fillRect/>
           </a:stretch>
         </p:blipFill>
         <p:spPr>
           <a:xfrm>
-            <a:off x="533400" y="1600201"/>
-            <a:ext cx="7924800" cy="4038600"/>
+            <a:off x="381000" y="1295399"/>
+            <a:ext cx="7772400" cy="5787543"/>
           </a:xfrm>
           <a:prstGeom prst="rect">
             <a:avLst/>
@@ -5578,11 +5585,7 @@
             <a:pPr lvl="1"/>
             <a:r>
               <a:rPr lang="en-US" dirty="0" smtClean="0"/>
-              <a:t>C</a:t>
-            </a:r>
-            <a:r>
-              <a:rPr lang="en-US" dirty="0" smtClean="0"/>
-              <a:t>onfiguration </a:t>
+              <a:t>Configuration </a:t>
             </a:r>
           </a:p>
           <a:p>

</xml_diff>